<commit_message>
Add a picture for current C++ work
</commit_message>
<xml_diff>
--- a/C++11.pptx
+++ b/C++11.pptx
@@ -5,10 +5,10 @@
     <p:sldMasterId id="2147483804" r:id="rId1"/>
   </p:sldMasterIdLst>
   <p:notesMasterIdLst>
-    <p:notesMasterId r:id="rId28"/>
+    <p:notesMasterId r:id="rId29"/>
   </p:notesMasterIdLst>
   <p:handoutMasterIdLst>
-    <p:handoutMasterId r:id="rId29"/>
+    <p:handoutMasterId r:id="rId30"/>
   </p:handoutMasterIdLst>
   <p:sldIdLst>
     <p:sldId id="553" r:id="rId2"/>
@@ -20,23 +20,24 @@
     <p:sldId id="575" r:id="rId8"/>
     <p:sldId id="577" r:id="rId9"/>
     <p:sldId id="573" r:id="rId10"/>
-    <p:sldId id="574" r:id="rId11"/>
-    <p:sldId id="570" r:id="rId12"/>
-    <p:sldId id="503" r:id="rId13"/>
-    <p:sldId id="533" r:id="rId14"/>
-    <p:sldId id="456" r:id="rId15"/>
-    <p:sldId id="534" r:id="rId16"/>
-    <p:sldId id="433" r:id="rId17"/>
-    <p:sldId id="535" r:id="rId18"/>
-    <p:sldId id="435" r:id="rId19"/>
-    <p:sldId id="562" r:id="rId20"/>
-    <p:sldId id="563" r:id="rId21"/>
-    <p:sldId id="564" r:id="rId22"/>
-    <p:sldId id="565" r:id="rId23"/>
-    <p:sldId id="451" r:id="rId24"/>
-    <p:sldId id="441" r:id="rId25"/>
-    <p:sldId id="455" r:id="rId26"/>
-    <p:sldId id="566" r:id="rId27"/>
+    <p:sldId id="578" r:id="rId11"/>
+    <p:sldId id="574" r:id="rId12"/>
+    <p:sldId id="570" r:id="rId13"/>
+    <p:sldId id="503" r:id="rId14"/>
+    <p:sldId id="533" r:id="rId15"/>
+    <p:sldId id="456" r:id="rId16"/>
+    <p:sldId id="534" r:id="rId17"/>
+    <p:sldId id="433" r:id="rId18"/>
+    <p:sldId id="535" r:id="rId19"/>
+    <p:sldId id="435" r:id="rId20"/>
+    <p:sldId id="562" r:id="rId21"/>
+    <p:sldId id="563" r:id="rId22"/>
+    <p:sldId id="564" r:id="rId23"/>
+    <p:sldId id="565" r:id="rId24"/>
+    <p:sldId id="451" r:id="rId25"/>
+    <p:sldId id="441" r:id="rId26"/>
+    <p:sldId id="455" r:id="rId27"/>
+    <p:sldId id="566" r:id="rId28"/>
   </p:sldIdLst>
   <p:sldSz cx="9144000" cy="5143500" type="screen16x9"/>
   <p:notesSz cx="6858000" cy="9144000"/>
@@ -552,11 +553,11 @@
         </c:dLbls>
         <c:gapWidth val="150"/>
         <c:overlap val="-15"/>
-        <c:axId val="63696256"/>
-        <c:axId val="63698048"/>
+        <c:axId val="97396608"/>
+        <c:axId val="97398144"/>
       </c:barChart>
       <c:catAx>
-        <c:axId val="63696256"/>
+        <c:axId val="97396608"/>
         <c:scaling>
           <c:orientation val="minMax"/>
         </c:scaling>
@@ -576,7 +577,7 @@
             <a:endParaRPr lang="zh-CN"/>
           </a:p>
         </c:txPr>
-        <c:crossAx val="63698048"/>
+        <c:crossAx val="97398144"/>
         <c:crosses val="autoZero"/>
         <c:auto val="1"/>
         <c:lblAlgn val="ctr"/>
@@ -584,7 +585,7 @@
         <c:noMultiLvlLbl val="0"/>
       </c:catAx>
       <c:valAx>
-        <c:axId val="63698048"/>
+        <c:axId val="97398144"/>
         <c:scaling>
           <c:orientation val="minMax"/>
           <c:max val="5"/>
@@ -606,7 +607,7 @@
             <a:endParaRPr lang="zh-CN"/>
           </a:p>
         </c:txPr>
-        <c:crossAx val="63696256"/>
+        <c:crossAx val="97396608"/>
         <c:crosses val="autoZero"/>
         <c:crossBetween val="between"/>
         <c:majorUnit val="1"/>
@@ -919,11 +920,11 @@
         </c:dLbls>
         <c:marker val="1"/>
         <c:smooth val="0"/>
-        <c:axId val="63446400"/>
-        <c:axId val="63456384"/>
+        <c:axId val="114268032"/>
+        <c:axId val="114269568"/>
       </c:lineChart>
       <c:catAx>
-        <c:axId val="63446400"/>
+        <c:axId val="114268032"/>
         <c:scaling>
           <c:orientation val="minMax"/>
         </c:scaling>
@@ -938,7 +939,7 @@
             <a:noFill/>
           </a:ln>
         </c:spPr>
-        <c:crossAx val="63456384"/>
+        <c:crossAx val="114269568"/>
         <c:crosses val="autoZero"/>
         <c:auto val="1"/>
         <c:lblAlgn val="ctr"/>
@@ -946,7 +947,7 @@
         <c:noMultiLvlLbl val="0"/>
       </c:catAx>
       <c:valAx>
-        <c:axId val="63456384"/>
+        <c:axId val="114269568"/>
         <c:scaling>
           <c:orientation val="minMax"/>
           <c:max val="5"/>
@@ -973,7 +974,7 @@
             <a:noFill/>
           </a:ln>
         </c:spPr>
-        <c:crossAx val="63446400"/>
+        <c:crossAx val="114268032"/>
         <c:crosses val="autoZero"/>
         <c:crossBetween val="between"/>
         <c:majorUnit val="1"/>
@@ -1108,7 +1109,7 @@
                 <a:cs typeface="HP Simplified"/>
               </a:rPr>
               <a:pPr/>
-              <a:t>11/12/2013</a:t>
+              <a:t>11/13/2013</a:t>
             </a:fld>
             <a:endParaRPr lang="en-GB" dirty="0">
               <a:latin typeface="HP Simplified"/>
@@ -1294,7 +1295,7 @@
             <a:fld id="{2D9CAF8C-0805-8440-B43D-DCCAAA4D80CE}" type="datetimeFigureOut">
               <a:rPr lang="en-US" smtClean="0"/>
               <a:pPr/>
-              <a:t>11/12/2013</a:t>
+              <a:t>11/13/2013</a:t>
             </a:fld>
             <a:endParaRPr lang="en-GB" dirty="0"/>
           </a:p>
@@ -1748,7 +1749,7 @@
             <a:fld id="{22A853E8-D85F-5D49-95D2-E1D96ABFE2B9}" type="slidenum">
               <a:rPr lang="en-GB" smtClean="0"/>
               <a:pPr/>
-              <a:t>18</a:t>
+              <a:t>19</a:t>
             </a:fld>
             <a:endParaRPr lang="en-GB" dirty="0"/>
           </a:p>
@@ -6375,8 +6376,8 @@
         </p:nvSpPr>
         <p:spPr>
           <a:xfrm>
-            <a:off x="2830286" y="2194493"/>
-            <a:ext cx="3976913" cy="708363"/>
+            <a:off x="2830287" y="2194493"/>
+            <a:ext cx="3164114" cy="708363"/>
           </a:xfrm>
         </p:spPr>
         <p:txBody>
@@ -6385,7 +6386,7 @@
           <a:p>
             <a:r>
               <a:rPr lang="en-GB" sz="3600" dirty="0" smtClean="0"/>
-              <a:t>After C++11……</a:t>
+              <a:t>Current C++11</a:t>
             </a:r>
             <a:endParaRPr lang="en-GB" sz="3600" dirty="0"/>
           </a:p>
@@ -6394,7 +6395,7 @@
     </p:spTree>
     <p:extLst>
       <p:ext uri="{BB962C8B-B14F-4D97-AF65-F5344CB8AC3E}">
-        <p14:creationId xmlns:p14="http://schemas.microsoft.com/office/powerpoint/2010/main" val="2495056151"/>
+        <p14:creationId xmlns:p14="http://schemas.microsoft.com/office/powerpoint/2010/main" val="3462151274"/>
       </p:ext>
     </p:extLst>
   </p:cSld>
@@ -6430,29 +6431,7 @@
       </p:grpSpPr>
       <p:sp>
         <p:nvSpPr>
-          <p:cNvPr id="4" name="Subtitle 3"/>
-          <p:cNvSpPr>
-            <a:spLocks noGrp="1"/>
-          </p:cNvSpPr>
-          <p:nvPr>
-            <p:ph type="subTitle" idx="1"/>
-          </p:nvPr>
-        </p:nvSpPr>
-        <p:spPr/>
-        <p:txBody>
-          <a:bodyPr/>
-          <a:lstStyle/>
-          <a:p>
-            <a:r>
-              <a:rPr lang="en-US" dirty="0" smtClean="0"/>
-              <a:t>Subtitle (18 pt. HP Simplified)</a:t>
-            </a:r>
-          </a:p>
-        </p:txBody>
-      </p:sp>
-      <p:sp>
-        <p:nvSpPr>
-          <p:cNvPr id="2" name="Title 1"/>
+          <p:cNvPr id="4" name="Title 3"/>
           <p:cNvSpPr>
             <a:spLocks noGrp="1"/>
           </p:cNvSpPr>
@@ -6460,101 +6439,30 @@
             <p:ph type="title"/>
           </p:nvPr>
         </p:nvSpPr>
-        <p:spPr/>
+        <p:spPr>
+          <a:xfrm>
+            <a:off x="2830286" y="2194493"/>
+            <a:ext cx="3976913" cy="708363"/>
+          </a:xfrm>
+        </p:spPr>
         <p:txBody>
           <a:bodyPr/>
           <a:lstStyle/>
           <a:p>
             <a:r>
-              <a:rPr lang="en-GB" dirty="0" smtClean="0"/>
-              <a:t>Title (28 pt. HP Simplified bold)</a:t>
-            </a:r>
-            <a:endParaRPr lang="en-US" dirty="0"/>
-          </a:p>
-        </p:txBody>
-      </p:sp>
-      <p:sp>
-        <p:nvSpPr>
-          <p:cNvPr id="5" name="Content Placeholder 4"/>
-          <p:cNvSpPr>
-            <a:spLocks noGrp="1"/>
-          </p:cNvSpPr>
-          <p:nvPr>
-            <p:ph sz="quarter" idx="10"/>
-          </p:nvPr>
-        </p:nvSpPr>
-        <p:spPr/>
-        <p:txBody>
-          <a:bodyPr/>
-          <a:lstStyle/>
-          <a:p>
-            <a:r>
-              <a:rPr lang="en-US" dirty="0" smtClean="0"/>
-              <a:t>Put your first-level bullet here. Try to keep bullet lists simple. (14 pt. HP Simplified)</a:t>
-            </a:r>
-          </a:p>
-          <a:p>
-            <a:pPr lvl="1"/>
-            <a:r>
-              <a:rPr lang="en-US" dirty="0" smtClean="0"/>
-              <a:t>Put your second-level bullet here. Use no more than you need to explain your point. </a:t>
-            </a:r>
-            <a:br>
-              <a:rPr lang="en-US" dirty="0" smtClean="0"/>
-            </a:br>
-            <a:r>
-              <a:rPr lang="en-US" dirty="0" smtClean="0"/>
-              <a:t>(14 pt. HP Simplified)</a:t>
-            </a:r>
-          </a:p>
-          <a:p>
-            <a:pPr lvl="2"/>
-            <a:r>
-              <a:rPr lang="en-US" dirty="0" smtClean="0"/>
-              <a:t>Put your third-level of copy here. Use no more than you need to explain your point. </a:t>
-            </a:r>
-            <a:br>
-              <a:rPr lang="en-US" dirty="0" smtClean="0"/>
-            </a:br>
-            <a:r>
-              <a:rPr lang="en-US" dirty="0" smtClean="0"/>
-              <a:t>(14 pt. HP Simplified) </a:t>
-            </a:r>
-          </a:p>
-          <a:p>
-            <a:pPr lvl="3"/>
-            <a:r>
-              <a:rPr lang="en-US" dirty="0" smtClean="0"/>
-              <a:t>Put your fourth-level of copy here. Use no more than you need to explain your point. </a:t>
-            </a:r>
-            <a:br>
-              <a:rPr lang="en-US" dirty="0" smtClean="0"/>
-            </a:br>
-            <a:r>
-              <a:rPr lang="en-US" dirty="0" smtClean="0"/>
-              <a:t>(14 pt. HP Simplified)</a:t>
-            </a:r>
-          </a:p>
-          <a:p>
-            <a:pPr lvl="4"/>
-            <a:r>
-              <a:rPr lang="en-US" dirty="0" smtClean="0"/>
-              <a:t>Put your fifth-level of copy here. Use no more than you need to explain your point. </a:t>
-            </a:r>
-            <a:br>
-              <a:rPr lang="en-US" dirty="0" smtClean="0"/>
-            </a:br>
-            <a:r>
-              <a:rPr lang="en-US" dirty="0" smtClean="0"/>
-              <a:t>(14 pt. HP Simplified)</a:t>
-            </a:r>
-          </a:p>
-          <a:p>
-            <a:endParaRPr lang="en-US" dirty="0"/>
+              <a:rPr lang="en-GB" sz="3600" dirty="0" smtClean="0"/>
+              <a:t>After C++11……</a:t>
+            </a:r>
+            <a:endParaRPr lang="en-GB" sz="3600" dirty="0"/>
           </a:p>
         </p:txBody>
       </p:sp>
     </p:spTree>
+    <p:extLst>
+      <p:ext uri="{BB962C8B-B14F-4D97-AF65-F5344CB8AC3E}">
+        <p14:creationId xmlns:p14="http://schemas.microsoft.com/office/powerpoint/2010/main" val="2495056151"/>
+      </p:ext>
+    </p:extLst>
   </p:cSld>
   <p:clrMapOvr>
     <a:masterClrMapping/>
@@ -6588,7 +6496,29 @@
       </p:grpSpPr>
       <p:sp>
         <p:nvSpPr>
-          <p:cNvPr id="4" name="Title 3"/>
+          <p:cNvPr id="4" name="Subtitle 3"/>
+          <p:cNvSpPr>
+            <a:spLocks noGrp="1"/>
+          </p:cNvSpPr>
+          <p:nvPr>
+            <p:ph type="subTitle" idx="1"/>
+          </p:nvPr>
+        </p:nvSpPr>
+        <p:spPr/>
+        <p:txBody>
+          <a:bodyPr/>
+          <a:lstStyle/>
+          <a:p>
+            <a:r>
+              <a:rPr lang="en-US" dirty="0" smtClean="0"/>
+              <a:t>Subtitle (18 pt. HP Simplified)</a:t>
+            </a:r>
+          </a:p>
+        </p:txBody>
+      </p:sp>
+      <p:sp>
+        <p:nvSpPr>
+          <p:cNvPr id="2" name="Title 1"/>
           <p:cNvSpPr>
             <a:spLocks noGrp="1"/>
           </p:cNvSpPr>
@@ -6602,20 +6532,21 @@
           <a:lstStyle/>
           <a:p>
             <a:r>
-              <a:rPr lang="en-GB" dirty="0"/>
+              <a:rPr lang="en-GB" dirty="0" smtClean="0"/>
               <a:t>Title (28 pt. HP Simplified bold)</a:t>
             </a:r>
+            <a:endParaRPr lang="en-US" dirty="0"/>
           </a:p>
         </p:txBody>
       </p:sp>
       <p:sp>
         <p:nvSpPr>
-          <p:cNvPr id="7" name="Text Placeholder 6"/>
+          <p:cNvPr id="5" name="Content Placeholder 4"/>
           <p:cNvSpPr>
             <a:spLocks noGrp="1"/>
           </p:cNvSpPr>
           <p:nvPr>
-            <p:ph sz="quarter" idx="16"/>
+            <p:ph sz="quarter" idx="10"/>
           </p:nvPr>
         </p:nvSpPr>
         <p:spPr/>
@@ -6624,192 +6555,72 @@
           <a:lstStyle/>
           <a:p>
             <a:r>
-              <a:rPr lang="en-US" dirty="0"/>
-              <a:t>Heading (18 pt. HP Simplified</a:t>
-            </a:r>
-            <a:r>
               <a:rPr lang="en-US" dirty="0" smtClean="0"/>
-              <a:t> bold </a:t>
+              <a:t>Put your first-level bullet here. Try to keep bullet lists simple. (14 pt. HP Simplified)</a:t>
+            </a:r>
+          </a:p>
+          <a:p>
+            <a:pPr lvl="1"/>
+            <a:r>
+              <a:rPr lang="en-US" dirty="0" smtClean="0"/>
+              <a:t>Put your second-level bullet here. Use no more than you need to explain your point. </a:t>
             </a:r>
             <a:br>
               <a:rPr lang="en-US" dirty="0" smtClean="0"/>
             </a:br>
             <a:r>
               <a:rPr lang="en-US" dirty="0" smtClean="0"/>
-              <a:t>HP </a:t>
-            </a:r>
-            <a:r>
-              <a:rPr lang="en-US" dirty="0"/>
-              <a:t>blue)</a:t>
-            </a:r>
-            <a:endParaRPr lang="en-GB" dirty="0"/>
-          </a:p>
-          <a:p>
-            <a:pPr lvl="1"/>
-            <a:r>
-              <a:rPr lang="en-US" dirty="0"/>
-              <a:t>Body copy (16 pt. HP Simplified)</a:t>
+              <a:t>(14 pt. HP Simplified)</a:t>
             </a:r>
           </a:p>
           <a:p>
             <a:pPr lvl="2"/>
             <a:r>
-              <a:rPr lang="en-US" dirty="0"/>
-              <a:t>Put your first-level bullet here. </a:t>
-            </a:r>
-            <a:br>
-              <a:rPr lang="en-US" dirty="0"/>
-            </a:br>
-            <a:r>
-              <a:rPr lang="en-US" dirty="0"/>
-              <a:t>(14 pt. HP Simplified)</a:t>
-            </a:r>
-          </a:p>
-          <a:p>
-            <a:pPr lvl="3"/>
-            <a:r>
-              <a:rPr lang="en-US" dirty="0"/>
-              <a:t>Put your second-level bullet here. </a:t>
-            </a:r>
-            <a:br>
-              <a:rPr lang="en-US" dirty="0"/>
-            </a:br>
-            <a:r>
-              <a:rPr lang="en-US" dirty="0"/>
-              <a:t>(14 pt. HP Simplified)</a:t>
-            </a:r>
-          </a:p>
-          <a:p>
-            <a:pPr lvl="4"/>
-            <a:r>
-              <a:rPr lang="en-US" dirty="0"/>
-              <a:t>Put your third-level of copy here. </a:t>
-            </a:r>
-            <a:br>
-              <a:rPr lang="en-US" dirty="0"/>
-            </a:br>
-            <a:r>
-              <a:rPr lang="en-US" dirty="0"/>
-              <a:t>(14 pt. HP Simplified)</a:t>
-            </a:r>
-          </a:p>
-        </p:txBody>
-      </p:sp>
-      <p:sp>
-        <p:nvSpPr>
-          <p:cNvPr id="18" name="Text Placeholder 17"/>
-          <p:cNvSpPr>
-            <a:spLocks noGrp="1"/>
-          </p:cNvSpPr>
-          <p:nvPr>
-            <p:ph sz="quarter" idx="17"/>
-          </p:nvPr>
-        </p:nvSpPr>
-        <p:spPr/>
-        <p:txBody>
-          <a:bodyPr/>
-          <a:lstStyle/>
-          <a:p>
-            <a:r>
-              <a:rPr lang="en-US" dirty="0"/>
-              <a:t>Heading (18 pt. HP Simplified</a:t>
-            </a:r>
-            <a:r>
               <a:rPr lang="en-US" dirty="0" smtClean="0"/>
-              <a:t> bold </a:t>
+              <a:t>Put your third-level of copy here. Use no more than you need to explain your point. </a:t>
             </a:r>
             <a:br>
               <a:rPr lang="en-US" dirty="0" smtClean="0"/>
             </a:br>
             <a:r>
               <a:rPr lang="en-US" dirty="0" smtClean="0"/>
-              <a:t>HP </a:t>
-            </a:r>
-            <a:r>
-              <a:rPr lang="en-US" dirty="0"/>
-              <a:t>blue)</a:t>
-            </a:r>
-            <a:endParaRPr lang="en-GB" dirty="0"/>
-          </a:p>
-          <a:p>
-            <a:pPr lvl="1"/>
-            <a:r>
-              <a:rPr lang="en-US" dirty="0"/>
-              <a:t>Body copy (16 pt. HP Simplified)</a:t>
-            </a:r>
-          </a:p>
-          <a:p>
-            <a:pPr lvl="2"/>
-            <a:r>
-              <a:rPr lang="en-US" dirty="0"/>
-              <a:t>Put your first-level bullet here. </a:t>
+              <a:t>(14 pt. HP Simplified) </a:t>
+            </a:r>
+          </a:p>
+          <a:p>
+            <a:pPr lvl="3"/>
+            <a:r>
+              <a:rPr lang="en-US" dirty="0" smtClean="0"/>
+              <a:t>Put your fourth-level of copy here. Use no more than you need to explain your point. </a:t>
             </a:r>
             <a:br>
-              <a:rPr lang="en-US" dirty="0"/>
+              <a:rPr lang="en-US" dirty="0" smtClean="0"/>
             </a:br>
             <a:r>
-              <a:rPr lang="en-US" dirty="0"/>
+              <a:rPr lang="en-US" dirty="0" smtClean="0"/>
               <a:t>(14 pt. HP Simplified)</a:t>
             </a:r>
           </a:p>
           <a:p>
-            <a:pPr lvl="3"/>
-            <a:r>
-              <a:rPr lang="en-US" dirty="0"/>
-              <a:t>Put your second-level bullet here. </a:t>
+            <a:pPr lvl="4"/>
+            <a:r>
+              <a:rPr lang="en-US" dirty="0" smtClean="0"/>
+              <a:t>Put your fifth-level of copy here. Use no more than you need to explain your point. </a:t>
             </a:r>
             <a:br>
-              <a:rPr lang="en-US" dirty="0"/>
+              <a:rPr lang="en-US" dirty="0" smtClean="0"/>
             </a:br>
             <a:r>
-              <a:rPr lang="en-US" dirty="0"/>
+              <a:rPr lang="en-US" dirty="0" smtClean="0"/>
               <a:t>(14 pt. HP Simplified)</a:t>
             </a:r>
           </a:p>
           <a:p>
-            <a:pPr lvl="4"/>
-            <a:r>
-              <a:rPr lang="en-US" dirty="0"/>
-              <a:t>Put your third-level of copy here. </a:t>
-            </a:r>
-            <a:br>
-              <a:rPr lang="en-US" dirty="0"/>
-            </a:br>
-            <a:r>
-              <a:rPr lang="en-US" dirty="0"/>
-              <a:t>(14 pt. HP Simplified)</a:t>
-            </a:r>
-          </a:p>
-        </p:txBody>
-      </p:sp>
-      <p:sp>
-        <p:nvSpPr>
-          <p:cNvPr id="2" name="Subtitle 1"/>
-          <p:cNvSpPr>
-            <a:spLocks noGrp="1"/>
-          </p:cNvSpPr>
-          <p:nvPr>
-            <p:ph type="subTitle" idx="1"/>
-          </p:nvPr>
-        </p:nvSpPr>
-        <p:spPr/>
-        <p:txBody>
-          <a:bodyPr/>
-          <a:lstStyle/>
-          <a:p>
-            <a:r>
-              <a:rPr lang="en-US" dirty="0"/>
-              <a:t>Subtitle (18 pt. HP Simplified)</a:t>
-            </a:r>
+            <a:endParaRPr lang="en-US" dirty="0"/>
           </a:p>
         </p:txBody>
       </p:sp>
     </p:spTree>
-    <p:extLst>
-      <p:ext uri="{BB962C8B-B14F-4D97-AF65-F5344CB8AC3E}">
-        <p14:creationId xmlns:p14="http://schemas.microsoft.com/office/powerpoint/2010/main" val="1774947844"/>
-      </p:ext>
-    </p:extLst>
   </p:cSld>
   <p:clrMapOvr>
     <a:masterClrMapping/>
@@ -7037,10 +6848,32 @@
           </a:p>
         </p:txBody>
       </p:sp>
+      <p:sp>
+        <p:nvSpPr>
+          <p:cNvPr id="2" name="Subtitle 1"/>
+          <p:cNvSpPr>
+            <a:spLocks noGrp="1"/>
+          </p:cNvSpPr>
+          <p:nvPr>
+            <p:ph type="subTitle" idx="1"/>
+          </p:nvPr>
+        </p:nvSpPr>
+        <p:spPr/>
+        <p:txBody>
+          <a:bodyPr/>
+          <a:lstStyle/>
+          <a:p>
+            <a:r>
+              <a:rPr lang="en-US" dirty="0"/>
+              <a:t>Subtitle (18 pt. HP Simplified)</a:t>
+            </a:r>
+          </a:p>
+        </p:txBody>
+      </p:sp>
     </p:spTree>
     <p:extLst>
       <p:ext uri="{BB962C8B-B14F-4D97-AF65-F5344CB8AC3E}">
-        <p14:creationId xmlns:p14="http://schemas.microsoft.com/office/powerpoint/2010/main" val="3716135975"/>
+        <p14:creationId xmlns:p14="http://schemas.microsoft.com/office/powerpoint/2010/main" val="1774947844"/>
       </p:ext>
     </p:extLst>
   </p:cSld>
@@ -7074,36 +6907,9 @@
           <a:chExt cx="0" cy="0"/>
         </a:xfrm>
       </p:grpSpPr>
-      <p:pic>
-        <p:nvPicPr>
-          <p:cNvPr id="6" name="Picture Placeholder 5" descr="_P1K4056.jpg"/>
-          <p:cNvPicPr>
-            <a:picLocks noGrp="1" noChangeAspect="1"/>
-          </p:cNvPicPr>
-          <p:nvPr>
-            <p:ph type="pic" sz="quarter" idx="11"/>
-          </p:nvPr>
-        </p:nvPicPr>
-        <p:blipFill rotWithShape="1">
-          <a:blip r:embed="rId2" cstate="email">
-            <a:extLst>
-              <a:ext uri="{28A0092B-C50C-407E-A947-70E740481C1C}">
-                <a14:useLocalDpi xmlns:a14="http://schemas.microsoft.com/office/drawing/2010/main"/>
-              </a:ext>
-            </a:extLst>
-          </a:blip>
-          <a:srcRect/>
-          <a:stretch/>
-        </p:blipFill>
-        <p:spPr>
-          <a:ln>
-            <a:noFill/>
-          </a:ln>
-        </p:spPr>
-      </p:pic>
       <p:sp>
         <p:nvSpPr>
-          <p:cNvPr id="2" name="Title 1"/>
+          <p:cNvPr id="4" name="Title 3"/>
           <p:cNvSpPr>
             <a:spLocks noGrp="1"/>
           </p:cNvSpPr>
@@ -7120,18 +6926,17 @@
               <a:rPr lang="en-GB" dirty="0"/>
               <a:t>Title (28 pt. HP Simplified bold)</a:t>
             </a:r>
-            <a:endParaRPr lang="en-US" dirty="0"/>
           </a:p>
         </p:txBody>
       </p:sp>
       <p:sp>
         <p:nvSpPr>
-          <p:cNvPr id="4" name="Content Placeholder 3"/>
+          <p:cNvPr id="7" name="Text Placeholder 6"/>
           <p:cNvSpPr>
             <a:spLocks noGrp="1"/>
           </p:cNvSpPr>
           <p:nvPr>
-            <p:ph sz="quarter" idx="10"/>
+            <p:ph sz="quarter" idx="16"/>
           </p:nvPr>
         </p:nvSpPr>
         <p:spPr/>
@@ -7213,12 +7018,12 @@
       </p:sp>
       <p:sp>
         <p:nvSpPr>
-          <p:cNvPr id="7" name="Subtitle 6"/>
+          <p:cNvPr id="18" name="Text Placeholder 17"/>
           <p:cNvSpPr>
             <a:spLocks noGrp="1"/>
           </p:cNvSpPr>
           <p:nvPr>
-            <p:ph type="subTitle" idx="1"/>
+            <p:ph sz="quarter" idx="17"/>
           </p:nvPr>
         </p:nvSpPr>
         <p:spPr/>
@@ -7228,7 +7033,72 @@
           <a:p>
             <a:r>
               <a:rPr lang="en-US" dirty="0"/>
-              <a:t>Subtitle (18 pt. HP Simplified)</a:t>
+              <a:t>Heading (18 pt. HP Simplified</a:t>
+            </a:r>
+            <a:r>
+              <a:rPr lang="en-US" dirty="0" smtClean="0"/>
+              <a:t> bold </a:t>
+            </a:r>
+            <a:br>
+              <a:rPr lang="en-US" dirty="0" smtClean="0"/>
+            </a:br>
+            <a:r>
+              <a:rPr lang="en-US" dirty="0" smtClean="0"/>
+              <a:t>HP </a:t>
+            </a:r>
+            <a:r>
+              <a:rPr lang="en-US" dirty="0"/>
+              <a:t>blue)</a:t>
+            </a:r>
+            <a:endParaRPr lang="en-GB" dirty="0"/>
+          </a:p>
+          <a:p>
+            <a:pPr lvl="1"/>
+            <a:r>
+              <a:rPr lang="en-US" dirty="0"/>
+              <a:t>Body copy (16 pt. HP Simplified)</a:t>
+            </a:r>
+          </a:p>
+          <a:p>
+            <a:pPr lvl="2"/>
+            <a:r>
+              <a:rPr lang="en-US" dirty="0"/>
+              <a:t>Put your first-level bullet here. </a:t>
+            </a:r>
+            <a:br>
+              <a:rPr lang="en-US" dirty="0"/>
+            </a:br>
+            <a:r>
+              <a:rPr lang="en-US" dirty="0"/>
+              <a:t>(14 pt. HP Simplified)</a:t>
+            </a:r>
+          </a:p>
+          <a:p>
+            <a:pPr lvl="3"/>
+            <a:r>
+              <a:rPr lang="en-US" dirty="0"/>
+              <a:t>Put your second-level bullet here. </a:t>
+            </a:r>
+            <a:br>
+              <a:rPr lang="en-US" dirty="0"/>
+            </a:br>
+            <a:r>
+              <a:rPr lang="en-US" dirty="0"/>
+              <a:t>(14 pt. HP Simplified)</a:t>
+            </a:r>
+          </a:p>
+          <a:p>
+            <a:pPr lvl="4"/>
+            <a:r>
+              <a:rPr lang="en-US" dirty="0"/>
+              <a:t>Put your third-level of copy here. </a:t>
+            </a:r>
+            <a:br>
+              <a:rPr lang="en-US" dirty="0"/>
+            </a:br>
+            <a:r>
+              <a:rPr lang="en-US" dirty="0"/>
+              <a:t>(14 pt. HP Simplified)</a:t>
             </a:r>
           </a:p>
         </p:txBody>
@@ -7236,7 +7106,7 @@
     </p:spTree>
     <p:extLst>
       <p:ext uri="{BB962C8B-B14F-4D97-AF65-F5344CB8AC3E}">
-        <p14:creationId xmlns:p14="http://schemas.microsoft.com/office/powerpoint/2010/main" val="2307050377"/>
+        <p14:creationId xmlns:p14="http://schemas.microsoft.com/office/powerpoint/2010/main" val="3716135975"/>
       </p:ext>
     </p:extLst>
   </p:cSld>
@@ -7407,10 +7277,32 @@
           </a:p>
         </p:txBody>
       </p:sp>
+      <p:sp>
+        <p:nvSpPr>
+          <p:cNvPr id="7" name="Subtitle 6"/>
+          <p:cNvSpPr>
+            <a:spLocks noGrp="1"/>
+          </p:cNvSpPr>
+          <p:nvPr>
+            <p:ph type="subTitle" idx="1"/>
+          </p:nvPr>
+        </p:nvSpPr>
+        <p:spPr/>
+        <p:txBody>
+          <a:bodyPr/>
+          <a:lstStyle/>
+          <a:p>
+            <a:r>
+              <a:rPr lang="en-US" dirty="0"/>
+              <a:t>Subtitle (18 pt. HP Simplified)</a:t>
+            </a:r>
+          </a:p>
+        </p:txBody>
+      </p:sp>
     </p:spTree>
     <p:extLst>
       <p:ext uri="{BB962C8B-B14F-4D97-AF65-F5344CB8AC3E}">
-        <p14:creationId xmlns:p14="http://schemas.microsoft.com/office/powerpoint/2010/main" val="2466128647"/>
+        <p14:creationId xmlns:p14="http://schemas.microsoft.com/office/powerpoint/2010/main" val="2307050377"/>
       </p:ext>
     </p:extLst>
   </p:cSld>
@@ -7444,9 +7336,36 @@
           <a:chExt cx="0" cy="0"/>
         </a:xfrm>
       </p:grpSpPr>
+      <p:pic>
+        <p:nvPicPr>
+          <p:cNvPr id="6" name="Picture Placeholder 5" descr="_P1K4056.jpg"/>
+          <p:cNvPicPr>
+            <a:picLocks noGrp="1" noChangeAspect="1"/>
+          </p:cNvPicPr>
+          <p:nvPr>
+            <p:ph type="pic" sz="quarter" idx="11"/>
+          </p:nvPr>
+        </p:nvPicPr>
+        <p:blipFill rotWithShape="1">
+          <a:blip r:embed="rId2" cstate="email">
+            <a:extLst>
+              <a:ext uri="{28A0092B-C50C-407E-A947-70E740481C1C}">
+                <a14:useLocalDpi xmlns:a14="http://schemas.microsoft.com/office/drawing/2010/main"/>
+              </a:ext>
+            </a:extLst>
+          </a:blip>
+          <a:srcRect/>
+          <a:stretch/>
+        </p:blipFill>
+        <p:spPr>
+          <a:ln>
+            <a:noFill/>
+          </a:ln>
+        </p:spPr>
+      </p:pic>
       <p:sp>
         <p:nvSpPr>
-          <p:cNvPr id="8" name="Title 7"/>
+          <p:cNvPr id="2" name="Title 1"/>
           <p:cNvSpPr>
             <a:spLocks noGrp="1"/>
           </p:cNvSpPr>
@@ -7469,88 +7388,12 @@
       </p:sp>
       <p:sp>
         <p:nvSpPr>
-          <p:cNvPr id="14" name="Text Placeholder 13"/>
+          <p:cNvPr id="4" name="Content Placeholder 3"/>
           <p:cNvSpPr>
             <a:spLocks noGrp="1"/>
           </p:cNvSpPr>
           <p:nvPr>
-            <p:ph sz="quarter" idx="16"/>
-          </p:nvPr>
-        </p:nvSpPr>
-        <p:spPr/>
-        <p:txBody>
-          <a:bodyPr>
-            <a:normAutofit/>
-          </a:bodyPr>
-          <a:lstStyle/>
-          <a:p>
-            <a:r>
-              <a:rPr lang="en-US" dirty="0"/>
-              <a:t>Heading (18 pt. HP Simplified</a:t>
-            </a:r>
-            <a:r>
-              <a:rPr lang="en-US" dirty="0" smtClean="0"/>
-              <a:t> bold HP </a:t>
-            </a:r>
-            <a:r>
-              <a:rPr lang="en-US" dirty="0"/>
-              <a:t>blue)</a:t>
-            </a:r>
-            <a:endParaRPr lang="en-GB" dirty="0"/>
-          </a:p>
-          <a:p>
-            <a:pPr lvl="1"/>
-            <a:r>
-              <a:rPr lang="en-US" dirty="0"/>
-              <a:t>Body copy</a:t>
-            </a:r>
-            <a:r>
-              <a:rPr lang="en-US" dirty="0" smtClean="0"/>
-              <a:t> </a:t>
-            </a:r>
-            <a:br>
-              <a:rPr lang="en-US" dirty="0" smtClean="0"/>
-            </a:br>
-            <a:r>
-              <a:rPr lang="en-US" dirty="0" smtClean="0"/>
-              <a:t>(</a:t>
-            </a:r>
-            <a:r>
-              <a:rPr lang="en-US" dirty="0"/>
-              <a:t>16 pt. HP Simplified)</a:t>
-            </a:r>
-          </a:p>
-          <a:p>
-            <a:pPr lvl="2"/>
-            <a:r>
-              <a:rPr lang="en-US" dirty="0"/>
-              <a:t>14 pt. HP Simplified</a:t>
-            </a:r>
-          </a:p>
-          <a:p>
-            <a:pPr lvl="3"/>
-            <a:r>
-              <a:rPr lang="en-US" dirty="0"/>
-              <a:t>14 pt. HP Simplified</a:t>
-            </a:r>
-          </a:p>
-          <a:p>
-            <a:pPr lvl="4"/>
-            <a:r>
-              <a:rPr lang="en-US" dirty="0"/>
-              <a:t>14 pt. HP Simplified</a:t>
-            </a:r>
-          </a:p>
-        </p:txBody>
-      </p:sp>
-      <p:sp>
-        <p:nvSpPr>
-          <p:cNvPr id="11" name="Text Placeholder 10"/>
-          <p:cNvSpPr>
-            <a:spLocks noGrp="1"/>
-          </p:cNvSpPr>
-          <p:nvPr>
-            <p:ph sz="quarter" idx="17"/>
+            <p:ph sz="quarter" idx="10"/>
           </p:nvPr>
         </p:nvSpPr>
         <p:spPr/>
@@ -7564,81 +7407,14 @@
             </a:r>
             <a:r>
               <a:rPr lang="en-US" dirty="0" smtClean="0"/>
-              <a:t> bold HP </a:t>
-            </a:r>
-            <a:r>
-              <a:rPr lang="en-US" dirty="0"/>
-              <a:t>blue)</a:t>
-            </a:r>
-            <a:endParaRPr lang="en-GB" dirty="0"/>
-          </a:p>
-          <a:p>
-            <a:pPr lvl="1"/>
-            <a:r>
-              <a:rPr lang="en-US" dirty="0"/>
-              <a:t>Body copy</a:t>
-            </a:r>
-            <a:r>
-              <a:rPr lang="en-US" dirty="0" smtClean="0"/>
-              <a:t> </a:t>
+              <a:t> bold </a:t>
             </a:r>
             <a:br>
               <a:rPr lang="en-US" dirty="0" smtClean="0"/>
             </a:br>
             <a:r>
               <a:rPr lang="en-US" dirty="0" smtClean="0"/>
-              <a:t>(</a:t>
-            </a:r>
-            <a:r>
-              <a:rPr lang="en-US" dirty="0"/>
-              <a:t>16 pt. HP Simplified)</a:t>
-            </a:r>
-          </a:p>
-          <a:p>
-            <a:pPr lvl="2"/>
-            <a:r>
-              <a:rPr lang="en-US" dirty="0"/>
-              <a:t>14 pt. HP Simplified</a:t>
-            </a:r>
-          </a:p>
-          <a:p>
-            <a:pPr lvl="3"/>
-            <a:r>
-              <a:rPr lang="en-US" dirty="0"/>
-              <a:t>14 pt. HP Simplified</a:t>
-            </a:r>
-          </a:p>
-          <a:p>
-            <a:pPr lvl="4"/>
-            <a:r>
-              <a:rPr lang="en-US" dirty="0"/>
-              <a:t>14 pt. HP Simplified</a:t>
-            </a:r>
-          </a:p>
-        </p:txBody>
-      </p:sp>
-      <p:sp>
-        <p:nvSpPr>
-          <p:cNvPr id="12" name="Text Placeholder 11"/>
-          <p:cNvSpPr>
-            <a:spLocks noGrp="1"/>
-          </p:cNvSpPr>
-          <p:nvPr>
-            <p:ph sz="quarter" idx="18"/>
-          </p:nvPr>
-        </p:nvSpPr>
-        <p:spPr/>
-        <p:txBody>
-          <a:bodyPr/>
-          <a:lstStyle/>
-          <a:p>
-            <a:r>
-              <a:rPr lang="en-US" dirty="0"/>
-              <a:t>Heading (18 pt. HP Simplified</a:t>
-            </a:r>
-            <a:r>
-              <a:rPr lang="en-US" dirty="0" smtClean="0"/>
-              <a:t> bold HP </a:t>
+              <a:t>HP </a:t>
             </a:r>
             <a:r>
               <a:rPr lang="en-US" dirty="0"/>
@@ -7650,74 +7426,59 @@
             <a:pPr lvl="1"/>
             <a:r>
               <a:rPr lang="en-US" dirty="0"/>
-              <a:t>Body </a:t>
-            </a:r>
-            <a:r>
-              <a:rPr lang="en-US"/>
-              <a:t>copy</a:t>
-            </a:r>
-            <a:r>
-              <a:rPr lang="en-US" smtClean="0"/>
-              <a:t> </a:t>
+              <a:t>Body copy (16 pt. HP Simplified)</a:t>
+            </a:r>
+          </a:p>
+          <a:p>
+            <a:pPr lvl="2"/>
+            <a:r>
+              <a:rPr lang="en-US" dirty="0"/>
+              <a:t>Put your first-level bullet here. </a:t>
             </a:r>
             <a:br>
-              <a:rPr lang="en-US" smtClean="0"/>
+              <a:rPr lang="en-US" dirty="0"/>
             </a:br>
             <a:r>
-              <a:rPr lang="en-US" smtClean="0"/>
-              <a:t>(</a:t>
-            </a:r>
-            <a:r>
               <a:rPr lang="en-US" dirty="0"/>
-              <a:t>16 pt. HP Simplified)</a:t>
-            </a:r>
-          </a:p>
-          <a:p>
-            <a:pPr lvl="2"/>
+              <a:t>(14 pt. HP Simplified)</a:t>
+            </a:r>
+          </a:p>
+          <a:p>
+            <a:pPr lvl="3"/>
             <a:r>
               <a:rPr lang="en-US" dirty="0"/>
-              <a:t>14 pt. HP Simplified</a:t>
-            </a:r>
-          </a:p>
-          <a:p>
-            <a:pPr lvl="3"/>
-            <a:r>
+              <a:t>Put your second-level bullet here. </a:t>
+            </a:r>
+            <a:br>
               <a:rPr lang="en-US" dirty="0"/>
-              <a:t>14 pt. HP Simplified</a:t>
+            </a:br>
+            <a:r>
+              <a:rPr lang="en-US" dirty="0"/>
+              <a:t>(14 pt. HP Simplified)</a:t>
             </a:r>
           </a:p>
           <a:p>
             <a:pPr lvl="4"/>
             <a:r>
               <a:rPr lang="en-US" dirty="0"/>
-              <a:t>14 pt. HP Simplified</a:t>
-            </a:r>
-          </a:p>
-        </p:txBody>
-      </p:sp>
-      <p:sp>
-        <p:nvSpPr>
-          <p:cNvPr id="2" name="Subtitle 1"/>
-          <p:cNvSpPr>
-            <a:spLocks noGrp="1"/>
-          </p:cNvSpPr>
-          <p:nvPr>
-            <p:ph type="subTitle" idx="1"/>
-          </p:nvPr>
-        </p:nvSpPr>
-        <p:spPr/>
-        <p:txBody>
-          <a:bodyPr/>
-          <a:lstStyle/>
-          <a:p>
-            <a:r>
+              <a:t>Put your third-level of copy here. </a:t>
+            </a:r>
+            <a:br>
               <a:rPr lang="en-US" dirty="0"/>
-              <a:t>Subtitle (18 pt. HP Simplified)</a:t>
+            </a:br>
+            <a:r>
+              <a:rPr lang="en-US" dirty="0"/>
+              <a:t>(14 pt. HP Simplified)</a:t>
             </a:r>
           </a:p>
         </p:txBody>
       </p:sp>
     </p:spTree>
+    <p:extLst>
+      <p:ext uri="{BB962C8B-B14F-4D97-AF65-F5344CB8AC3E}">
+        <p14:creationId xmlns:p14="http://schemas.microsoft.com/office/powerpoint/2010/main" val="2466128647"/>
+      </p:ext>
+    </p:extLst>
   </p:cSld>
   <p:clrMapOvr>
     <a:masterClrMapping/>
@@ -7795,6 +7556,311 @@
             </a:r>
             <a:r>
               <a:rPr lang="en-US" dirty="0" smtClean="0"/>
+              <a:t> bold HP </a:t>
+            </a:r>
+            <a:r>
+              <a:rPr lang="en-US" dirty="0"/>
+              <a:t>blue)</a:t>
+            </a:r>
+            <a:endParaRPr lang="en-GB" dirty="0"/>
+          </a:p>
+          <a:p>
+            <a:pPr lvl="1"/>
+            <a:r>
+              <a:rPr lang="en-US" dirty="0"/>
+              <a:t>Body copy</a:t>
+            </a:r>
+            <a:r>
+              <a:rPr lang="en-US" dirty="0" smtClean="0"/>
+              <a:t> </a:t>
+            </a:r>
+            <a:br>
+              <a:rPr lang="en-US" dirty="0" smtClean="0"/>
+            </a:br>
+            <a:r>
+              <a:rPr lang="en-US" dirty="0" smtClean="0"/>
+              <a:t>(</a:t>
+            </a:r>
+            <a:r>
+              <a:rPr lang="en-US" dirty="0"/>
+              <a:t>16 pt. HP Simplified)</a:t>
+            </a:r>
+          </a:p>
+          <a:p>
+            <a:pPr lvl="2"/>
+            <a:r>
+              <a:rPr lang="en-US" dirty="0"/>
+              <a:t>14 pt. HP Simplified</a:t>
+            </a:r>
+          </a:p>
+          <a:p>
+            <a:pPr lvl="3"/>
+            <a:r>
+              <a:rPr lang="en-US" dirty="0"/>
+              <a:t>14 pt. HP Simplified</a:t>
+            </a:r>
+          </a:p>
+          <a:p>
+            <a:pPr lvl="4"/>
+            <a:r>
+              <a:rPr lang="en-US" dirty="0"/>
+              <a:t>14 pt. HP Simplified</a:t>
+            </a:r>
+          </a:p>
+        </p:txBody>
+      </p:sp>
+      <p:sp>
+        <p:nvSpPr>
+          <p:cNvPr id="11" name="Text Placeholder 10"/>
+          <p:cNvSpPr>
+            <a:spLocks noGrp="1"/>
+          </p:cNvSpPr>
+          <p:nvPr>
+            <p:ph sz="quarter" idx="17"/>
+          </p:nvPr>
+        </p:nvSpPr>
+        <p:spPr/>
+        <p:txBody>
+          <a:bodyPr/>
+          <a:lstStyle/>
+          <a:p>
+            <a:r>
+              <a:rPr lang="en-US" dirty="0"/>
+              <a:t>Heading (18 pt. HP Simplified</a:t>
+            </a:r>
+            <a:r>
+              <a:rPr lang="en-US" dirty="0" smtClean="0"/>
+              <a:t> bold HP </a:t>
+            </a:r>
+            <a:r>
+              <a:rPr lang="en-US" dirty="0"/>
+              <a:t>blue)</a:t>
+            </a:r>
+            <a:endParaRPr lang="en-GB" dirty="0"/>
+          </a:p>
+          <a:p>
+            <a:pPr lvl="1"/>
+            <a:r>
+              <a:rPr lang="en-US" dirty="0"/>
+              <a:t>Body copy</a:t>
+            </a:r>
+            <a:r>
+              <a:rPr lang="en-US" dirty="0" smtClean="0"/>
+              <a:t> </a:t>
+            </a:r>
+            <a:br>
+              <a:rPr lang="en-US" dirty="0" smtClean="0"/>
+            </a:br>
+            <a:r>
+              <a:rPr lang="en-US" dirty="0" smtClean="0"/>
+              <a:t>(</a:t>
+            </a:r>
+            <a:r>
+              <a:rPr lang="en-US" dirty="0"/>
+              <a:t>16 pt. HP Simplified)</a:t>
+            </a:r>
+          </a:p>
+          <a:p>
+            <a:pPr lvl="2"/>
+            <a:r>
+              <a:rPr lang="en-US" dirty="0"/>
+              <a:t>14 pt. HP Simplified</a:t>
+            </a:r>
+          </a:p>
+          <a:p>
+            <a:pPr lvl="3"/>
+            <a:r>
+              <a:rPr lang="en-US" dirty="0"/>
+              <a:t>14 pt. HP Simplified</a:t>
+            </a:r>
+          </a:p>
+          <a:p>
+            <a:pPr lvl="4"/>
+            <a:r>
+              <a:rPr lang="en-US" dirty="0"/>
+              <a:t>14 pt. HP Simplified</a:t>
+            </a:r>
+          </a:p>
+        </p:txBody>
+      </p:sp>
+      <p:sp>
+        <p:nvSpPr>
+          <p:cNvPr id="12" name="Text Placeholder 11"/>
+          <p:cNvSpPr>
+            <a:spLocks noGrp="1"/>
+          </p:cNvSpPr>
+          <p:nvPr>
+            <p:ph sz="quarter" idx="18"/>
+          </p:nvPr>
+        </p:nvSpPr>
+        <p:spPr/>
+        <p:txBody>
+          <a:bodyPr/>
+          <a:lstStyle/>
+          <a:p>
+            <a:r>
+              <a:rPr lang="en-US" dirty="0"/>
+              <a:t>Heading (18 pt. HP Simplified</a:t>
+            </a:r>
+            <a:r>
+              <a:rPr lang="en-US" dirty="0" smtClean="0"/>
+              <a:t> bold HP </a:t>
+            </a:r>
+            <a:r>
+              <a:rPr lang="en-US" dirty="0"/>
+              <a:t>blue)</a:t>
+            </a:r>
+            <a:endParaRPr lang="en-GB" dirty="0"/>
+          </a:p>
+          <a:p>
+            <a:pPr lvl="1"/>
+            <a:r>
+              <a:rPr lang="en-US" dirty="0"/>
+              <a:t>Body </a:t>
+            </a:r>
+            <a:r>
+              <a:rPr lang="en-US"/>
+              <a:t>copy</a:t>
+            </a:r>
+            <a:r>
+              <a:rPr lang="en-US" smtClean="0"/>
+              <a:t> </a:t>
+            </a:r>
+            <a:br>
+              <a:rPr lang="en-US" smtClean="0"/>
+            </a:br>
+            <a:r>
+              <a:rPr lang="en-US" smtClean="0"/>
+              <a:t>(</a:t>
+            </a:r>
+            <a:r>
+              <a:rPr lang="en-US" dirty="0"/>
+              <a:t>16 pt. HP Simplified)</a:t>
+            </a:r>
+          </a:p>
+          <a:p>
+            <a:pPr lvl="2"/>
+            <a:r>
+              <a:rPr lang="en-US" dirty="0"/>
+              <a:t>14 pt. HP Simplified</a:t>
+            </a:r>
+          </a:p>
+          <a:p>
+            <a:pPr lvl="3"/>
+            <a:r>
+              <a:rPr lang="en-US" dirty="0"/>
+              <a:t>14 pt. HP Simplified</a:t>
+            </a:r>
+          </a:p>
+          <a:p>
+            <a:pPr lvl="4"/>
+            <a:r>
+              <a:rPr lang="en-US" dirty="0"/>
+              <a:t>14 pt. HP Simplified</a:t>
+            </a:r>
+          </a:p>
+        </p:txBody>
+      </p:sp>
+      <p:sp>
+        <p:nvSpPr>
+          <p:cNvPr id="2" name="Subtitle 1"/>
+          <p:cNvSpPr>
+            <a:spLocks noGrp="1"/>
+          </p:cNvSpPr>
+          <p:nvPr>
+            <p:ph type="subTitle" idx="1"/>
+          </p:nvPr>
+        </p:nvSpPr>
+        <p:spPr/>
+        <p:txBody>
+          <a:bodyPr/>
+          <a:lstStyle/>
+          <a:p>
+            <a:r>
+              <a:rPr lang="en-US" dirty="0"/>
+              <a:t>Subtitle (18 pt. HP Simplified)</a:t>
+            </a:r>
+          </a:p>
+        </p:txBody>
+      </p:sp>
+    </p:spTree>
+  </p:cSld>
+  <p:clrMapOvr>
+    <a:masterClrMapping/>
+  </p:clrMapOvr>
+  <p:timing>
+    <p:tnLst>
+      <p:par>
+        <p:cTn id="1" dur="indefinite" restart="never" nodeType="tmRoot"/>
+      </p:par>
+    </p:tnLst>
+  </p:timing>
+</p:sld>
+</file>
+
+<file path=ppt/slides/slide18.xml><?xml version="1.0" encoding="utf-8"?>
+<p:sld xmlns:a="http://schemas.openxmlformats.org/drawingml/2006/main" xmlns:r="http://schemas.openxmlformats.org/officeDocument/2006/relationships" xmlns:p="http://schemas.openxmlformats.org/presentationml/2006/main">
+  <p:cSld>
+    <p:spTree>
+      <p:nvGrpSpPr>
+        <p:cNvPr id="1" name=""/>
+        <p:cNvGrpSpPr/>
+        <p:nvPr/>
+      </p:nvGrpSpPr>
+      <p:grpSpPr>
+        <a:xfrm>
+          <a:off x="0" y="0"/>
+          <a:ext cx="0" cy="0"/>
+          <a:chOff x="0" y="0"/>
+          <a:chExt cx="0" cy="0"/>
+        </a:xfrm>
+      </p:grpSpPr>
+      <p:sp>
+        <p:nvSpPr>
+          <p:cNvPr id="8" name="Title 7"/>
+          <p:cNvSpPr>
+            <a:spLocks noGrp="1"/>
+          </p:cNvSpPr>
+          <p:nvPr>
+            <p:ph type="title"/>
+          </p:nvPr>
+        </p:nvSpPr>
+        <p:spPr/>
+        <p:txBody>
+          <a:bodyPr/>
+          <a:lstStyle/>
+          <a:p>
+            <a:r>
+              <a:rPr lang="en-GB" dirty="0"/>
+              <a:t>Title (28 pt. HP Simplified bold)</a:t>
+            </a:r>
+            <a:endParaRPr lang="en-US" dirty="0"/>
+          </a:p>
+        </p:txBody>
+      </p:sp>
+      <p:sp>
+        <p:nvSpPr>
+          <p:cNvPr id="14" name="Text Placeholder 13"/>
+          <p:cNvSpPr>
+            <a:spLocks noGrp="1"/>
+          </p:cNvSpPr>
+          <p:nvPr>
+            <p:ph sz="quarter" idx="16"/>
+          </p:nvPr>
+        </p:nvSpPr>
+        <p:spPr/>
+        <p:txBody>
+          <a:bodyPr>
+            <a:normAutofit/>
+          </a:bodyPr>
+          <a:lstStyle/>
+          <a:p>
+            <a:r>
+              <a:rPr lang="en-US" dirty="0"/>
+              <a:t>Heading (18 pt. HP Simplified</a:t>
+            </a:r>
+            <a:r>
+              <a:rPr lang="en-US" dirty="0" smtClean="0"/>
               <a:t> bold HP blue</a:t>
             </a:r>
             <a:r>
@@ -8016,7 +8082,7 @@
 </p:sld>
 </file>
 
-<file path=ppt/slides/slide18.xml><?xml version="1.0" encoding="utf-8"?>
+<file path=ppt/slides/slide19.xml><?xml version="1.0" encoding="utf-8"?>
 <p:sld xmlns:a="http://schemas.openxmlformats.org/drawingml/2006/main" xmlns:r="http://schemas.openxmlformats.org/officeDocument/2006/relationships" xmlns:p="http://schemas.openxmlformats.org/presentationml/2006/main">
   <p:cSld>
     <p:spTree>
@@ -9150,7 +9216,133 @@
 </p:sld>
 </file>
 
-<file path=ppt/slides/slide19.xml><?xml version="1.0" encoding="utf-8"?>
+<file path=ppt/slides/slide2.xml><?xml version="1.0" encoding="utf-8"?>
+<p:sld xmlns:a="http://schemas.openxmlformats.org/drawingml/2006/main" xmlns:r="http://schemas.openxmlformats.org/officeDocument/2006/relationships" xmlns:p="http://schemas.openxmlformats.org/presentationml/2006/main">
+  <p:cSld>
+    <p:spTree>
+      <p:nvGrpSpPr>
+        <p:cNvPr id="1" name=""/>
+        <p:cNvGrpSpPr/>
+        <p:nvPr/>
+      </p:nvGrpSpPr>
+      <p:grpSpPr>
+        <a:xfrm>
+          <a:off x="0" y="0"/>
+          <a:ext cx="0" cy="0"/>
+          <a:chOff x="0" y="0"/>
+          <a:chExt cx="0" cy="0"/>
+        </a:xfrm>
+      </p:grpSpPr>
+      <p:sp>
+        <p:nvSpPr>
+          <p:cNvPr id="4" name="Title 3"/>
+          <p:cNvSpPr>
+            <a:spLocks noGrp="1"/>
+          </p:cNvSpPr>
+          <p:nvPr>
+            <p:ph type="title"/>
+          </p:nvPr>
+        </p:nvSpPr>
+        <p:spPr/>
+        <p:txBody>
+          <a:bodyPr/>
+          <a:lstStyle/>
+          <a:p>
+            <a:r>
+              <a:rPr lang="en-GB" dirty="0" smtClean="0"/>
+              <a:t>Agenda</a:t>
+            </a:r>
+            <a:endParaRPr lang="en-GB" dirty="0"/>
+          </a:p>
+        </p:txBody>
+      </p:sp>
+      <p:sp>
+        <p:nvSpPr>
+          <p:cNvPr id="7" name="Text Placeholder 6"/>
+          <p:cNvSpPr>
+            <a:spLocks noGrp="1"/>
+          </p:cNvSpPr>
+          <p:nvPr>
+            <p:ph sz="quarter" idx="10"/>
+          </p:nvPr>
+        </p:nvSpPr>
+        <p:spPr>
+          <a:xfrm>
+            <a:off x="329184" y="1188722"/>
+            <a:ext cx="8119872" cy="2860764"/>
+          </a:xfrm>
+        </p:spPr>
+        <p:txBody>
+          <a:bodyPr/>
+          <a:lstStyle/>
+          <a:p>
+            <a:pPr marL="285750" indent="-285750">
+              <a:buFont typeface="Arial" panose="020B0604020202020204" pitchFamily="34" charset="0"/>
+              <a:buChar char="•"/>
+            </a:pPr>
+            <a:r>
+              <a:rPr lang="en-US" sz="2400" dirty="0" smtClean="0"/>
+              <a:t>Pre C++11</a:t>
+            </a:r>
+          </a:p>
+          <a:p>
+            <a:pPr marL="285750" indent="-285750">
+              <a:buFont typeface="Arial" panose="020B0604020202020204" pitchFamily="34" charset="0"/>
+              <a:buChar char="•"/>
+            </a:pPr>
+            <a:endParaRPr lang="en-US" sz="2400" dirty="0"/>
+          </a:p>
+          <a:p>
+            <a:pPr marL="285750" indent="-285750">
+              <a:buFont typeface="Arial" panose="020B0604020202020204" pitchFamily="34" charset="0"/>
+              <a:buChar char="•"/>
+            </a:pPr>
+            <a:r>
+              <a:rPr lang="en-US" sz="2400" dirty="0" smtClean="0"/>
+              <a:t>C++11</a:t>
+            </a:r>
+          </a:p>
+          <a:p>
+            <a:pPr marL="285750" indent="-285750">
+              <a:buFont typeface="Arial" panose="020B0604020202020204" pitchFamily="34" charset="0"/>
+              <a:buChar char="•"/>
+            </a:pPr>
+            <a:endParaRPr lang="en-US" sz="2400" dirty="0"/>
+          </a:p>
+          <a:p>
+            <a:pPr marL="285750" indent="-285750">
+              <a:buFont typeface="Arial" panose="020B0604020202020204" pitchFamily="34" charset="0"/>
+              <a:buChar char="•"/>
+            </a:pPr>
+            <a:r>
+              <a:rPr lang="en-US" sz="2400" dirty="0" smtClean="0"/>
+              <a:t>Post C++11</a:t>
+            </a:r>
+            <a:endParaRPr lang="en-GB" sz="2400" dirty="0"/>
+          </a:p>
+        </p:txBody>
+      </p:sp>
+    </p:spTree>
+    <p:extLst>
+      <p:ext uri="{BB962C8B-B14F-4D97-AF65-F5344CB8AC3E}">
+        <p14:creationId xmlns:p14="http://schemas.microsoft.com/office/powerpoint/2010/main" val="1945731487"/>
+      </p:ext>
+    </p:extLst>
+  </p:cSld>
+  <p:clrMapOvr>
+    <a:masterClrMapping/>
+  </p:clrMapOvr>
+  <p:timing>
+    <p:tnLst>
+      <p:par>
+        <p:cTn id="1" dur="indefinite" restart="never" nodeType="tmRoot"/>
+      </p:par>
+    </p:tnLst>
+  </p:timing>
+</p:sld>
+</file>
+
+<file path=ppt/slides/slide20.xml><?xml version="1.0" encoding="utf-8"?>
 <p:sld xmlns:a="http://schemas.openxmlformats.org/drawingml/2006/main" xmlns:r="http://schemas.openxmlformats.org/officeDocument/2006/relationships" xmlns:p="http://schemas.openxmlformats.org/presentationml/2006/main">
   <p:cSld>
     <p:spTree>
@@ -13471,133 +13663,7 @@
 </p:sld>
 </file>
 
-<file path=ppt/slides/slide2.xml><?xml version="1.0" encoding="utf-8"?>
-<p:sld xmlns:a="http://schemas.openxmlformats.org/drawingml/2006/main" xmlns:r="http://schemas.openxmlformats.org/officeDocument/2006/relationships" xmlns:p="http://schemas.openxmlformats.org/presentationml/2006/main">
-  <p:cSld>
-    <p:spTree>
-      <p:nvGrpSpPr>
-        <p:cNvPr id="1" name=""/>
-        <p:cNvGrpSpPr/>
-        <p:nvPr/>
-      </p:nvGrpSpPr>
-      <p:grpSpPr>
-        <a:xfrm>
-          <a:off x="0" y="0"/>
-          <a:ext cx="0" cy="0"/>
-          <a:chOff x="0" y="0"/>
-          <a:chExt cx="0" cy="0"/>
-        </a:xfrm>
-      </p:grpSpPr>
-      <p:sp>
-        <p:nvSpPr>
-          <p:cNvPr id="4" name="Title 3"/>
-          <p:cNvSpPr>
-            <a:spLocks noGrp="1"/>
-          </p:cNvSpPr>
-          <p:nvPr>
-            <p:ph type="title"/>
-          </p:nvPr>
-        </p:nvSpPr>
-        <p:spPr/>
-        <p:txBody>
-          <a:bodyPr/>
-          <a:lstStyle/>
-          <a:p>
-            <a:r>
-              <a:rPr lang="en-GB" dirty="0" smtClean="0"/>
-              <a:t>Agenda</a:t>
-            </a:r>
-            <a:endParaRPr lang="en-GB" dirty="0"/>
-          </a:p>
-        </p:txBody>
-      </p:sp>
-      <p:sp>
-        <p:nvSpPr>
-          <p:cNvPr id="7" name="Text Placeholder 6"/>
-          <p:cNvSpPr>
-            <a:spLocks noGrp="1"/>
-          </p:cNvSpPr>
-          <p:nvPr>
-            <p:ph sz="quarter" idx="10"/>
-          </p:nvPr>
-        </p:nvSpPr>
-        <p:spPr>
-          <a:xfrm>
-            <a:off x="329184" y="1188722"/>
-            <a:ext cx="8119872" cy="2860764"/>
-          </a:xfrm>
-        </p:spPr>
-        <p:txBody>
-          <a:bodyPr/>
-          <a:lstStyle/>
-          <a:p>
-            <a:pPr marL="285750" indent="-285750">
-              <a:buFont typeface="Arial" panose="020B0604020202020204" pitchFamily="34" charset="0"/>
-              <a:buChar char="•"/>
-            </a:pPr>
-            <a:r>
-              <a:rPr lang="en-US" sz="2400" dirty="0" smtClean="0"/>
-              <a:t>Pre C++11</a:t>
-            </a:r>
-          </a:p>
-          <a:p>
-            <a:pPr marL="285750" indent="-285750">
-              <a:buFont typeface="Arial" panose="020B0604020202020204" pitchFamily="34" charset="0"/>
-              <a:buChar char="•"/>
-            </a:pPr>
-            <a:endParaRPr lang="en-US" sz="2400" dirty="0"/>
-          </a:p>
-          <a:p>
-            <a:pPr marL="285750" indent="-285750">
-              <a:buFont typeface="Arial" panose="020B0604020202020204" pitchFamily="34" charset="0"/>
-              <a:buChar char="•"/>
-            </a:pPr>
-            <a:r>
-              <a:rPr lang="en-US" sz="2400" dirty="0" smtClean="0"/>
-              <a:t>C++11</a:t>
-            </a:r>
-          </a:p>
-          <a:p>
-            <a:pPr marL="285750" indent="-285750">
-              <a:buFont typeface="Arial" panose="020B0604020202020204" pitchFamily="34" charset="0"/>
-              <a:buChar char="•"/>
-            </a:pPr>
-            <a:endParaRPr lang="en-US" sz="2400" dirty="0"/>
-          </a:p>
-          <a:p>
-            <a:pPr marL="285750" indent="-285750">
-              <a:buFont typeface="Arial" panose="020B0604020202020204" pitchFamily="34" charset="0"/>
-              <a:buChar char="•"/>
-            </a:pPr>
-            <a:r>
-              <a:rPr lang="en-US" sz="2400" dirty="0" smtClean="0"/>
-              <a:t>Post C++11</a:t>
-            </a:r>
-            <a:endParaRPr lang="en-GB" sz="2400" dirty="0"/>
-          </a:p>
-        </p:txBody>
-      </p:sp>
-    </p:spTree>
-    <p:extLst>
-      <p:ext uri="{BB962C8B-B14F-4D97-AF65-F5344CB8AC3E}">
-        <p14:creationId xmlns:p14="http://schemas.microsoft.com/office/powerpoint/2010/main" val="1945731487"/>
-      </p:ext>
-    </p:extLst>
-  </p:cSld>
-  <p:clrMapOvr>
-    <a:masterClrMapping/>
-  </p:clrMapOvr>
-  <p:timing>
-    <p:tnLst>
-      <p:par>
-        <p:cTn id="1" dur="indefinite" restart="never" nodeType="tmRoot"/>
-      </p:par>
-    </p:tnLst>
-  </p:timing>
-</p:sld>
-</file>
-
-<file path=ppt/slides/slide20.xml><?xml version="1.0" encoding="utf-8"?>
+<file path=ppt/slides/slide21.xml><?xml version="1.0" encoding="utf-8"?>
 <p:sld xmlns:a="http://schemas.openxmlformats.org/drawingml/2006/main" xmlns:r="http://schemas.openxmlformats.org/officeDocument/2006/relationships" xmlns:p="http://schemas.openxmlformats.org/presentationml/2006/main">
   <p:cSld>
     <p:spTree>
@@ -19158,7 +19224,7 @@
 </p:sld>
 </file>
 
-<file path=ppt/slides/slide21.xml><?xml version="1.0" encoding="utf-8"?>
+<file path=ppt/slides/slide22.xml><?xml version="1.0" encoding="utf-8"?>
 <p:sld xmlns:a="http://schemas.openxmlformats.org/drawingml/2006/main" xmlns:r="http://schemas.openxmlformats.org/officeDocument/2006/relationships" xmlns:p="http://schemas.openxmlformats.org/presentationml/2006/main">
   <p:cSld>
     <p:spTree>
@@ -20634,7 +20700,7 @@
 </p:sld>
 </file>
 
-<file path=ppt/slides/slide22.xml><?xml version="1.0" encoding="utf-8"?>
+<file path=ppt/slides/slide23.xml><?xml version="1.0" encoding="utf-8"?>
 <p:sld xmlns:a="http://schemas.openxmlformats.org/drawingml/2006/main" xmlns:r="http://schemas.openxmlformats.org/officeDocument/2006/relationships" xmlns:p="http://schemas.openxmlformats.org/presentationml/2006/main">
   <p:cSld>
     <p:spTree>
@@ -21616,7 +21682,7 @@
 </p:sld>
 </file>
 
-<file path=ppt/slides/slide23.xml><?xml version="1.0" encoding="utf-8"?>
+<file path=ppt/slides/slide24.xml><?xml version="1.0" encoding="utf-8"?>
 <p:sld xmlns:a="http://schemas.openxmlformats.org/drawingml/2006/main" xmlns:r="http://schemas.openxmlformats.org/officeDocument/2006/relationships" xmlns:p="http://schemas.openxmlformats.org/presentationml/2006/main">
   <p:cSld>
     <p:spTree>
@@ -21770,7 +21836,7 @@
 </p:sld>
 </file>
 
-<file path=ppt/slides/slide24.xml><?xml version="1.0" encoding="utf-8"?>
+<file path=ppt/slides/slide25.xml><?xml version="1.0" encoding="utf-8"?>
 <p:sld xmlns:a="http://schemas.openxmlformats.org/drawingml/2006/main" xmlns:r="http://schemas.openxmlformats.org/officeDocument/2006/relationships" xmlns:p="http://schemas.openxmlformats.org/presentationml/2006/main">
   <p:cSld>
     <p:spTree>
@@ -21884,7 +21950,7 @@
 </p:sld>
 </file>
 
-<file path=ppt/slides/slide25.xml><?xml version="1.0" encoding="utf-8"?>
+<file path=ppt/slides/slide26.xml><?xml version="1.0" encoding="utf-8"?>
 <p:sld xmlns:a="http://schemas.openxmlformats.org/drawingml/2006/main" xmlns:r="http://schemas.openxmlformats.org/officeDocument/2006/relationships" xmlns:p="http://schemas.openxmlformats.org/presentationml/2006/main">
   <p:cSld>
     <p:spTree>
@@ -22009,7 +22075,7 @@
 </p:sld>
 </file>
 
-<file path=ppt/slides/slide26.xml><?xml version="1.0" encoding="utf-8"?>
+<file path=ppt/slides/slide27.xml><?xml version="1.0" encoding="utf-8"?>
 <p:sld xmlns:a="http://schemas.openxmlformats.org/drawingml/2006/main" xmlns:r="http://schemas.openxmlformats.org/officeDocument/2006/relationships" xmlns:p="http://schemas.openxmlformats.org/presentationml/2006/main">
   <p:cSld>
     <p:spTree>
@@ -23675,11 +23741,7 @@
           <a:p>
             <a:r>
               <a:rPr lang="en-US" dirty="0" smtClean="0"/>
-              <a:t>C++14 Committee Draft (CD) </a:t>
-            </a:r>
-            <a:r>
-              <a:rPr lang="en-US" dirty="0" smtClean="0"/>
-              <a:t>published at isocpp.org in May, 2013</a:t>
+              <a:t>C++14 Committee Draft (CD) published at isocpp.org in May, 2013</a:t>
             </a:r>
           </a:p>
           <a:p>
@@ -23907,34 +23969,60 @@
           <a:chExt cx="0" cy="0"/>
         </a:xfrm>
       </p:grpSpPr>
-      <p:sp>
-        <p:nvSpPr>
-          <p:cNvPr id="4" name="Title 3"/>
-          <p:cNvSpPr>
-            <a:spLocks noGrp="1"/>
-          </p:cNvSpPr>
-          <p:nvPr>
-            <p:ph type="title"/>
-          </p:nvPr>
-        </p:nvSpPr>
-        <p:spPr>
+      <p:pic>
+        <p:nvPicPr>
+          <p:cNvPr id="1026" name="Picture 2"/>
+          <p:cNvPicPr>
+            <a:picLocks noChangeAspect="1" noChangeArrowheads="1"/>
+          </p:cNvPicPr>
+          <p:nvPr/>
+        </p:nvPicPr>
+        <p:blipFill>
+          <a:blip r:embed="rId2">
+            <a:extLst>
+              <a:ext uri="{28A0092B-C50C-407E-A947-70E740481C1C}">
+                <a14:useLocalDpi xmlns:a14="http://schemas.microsoft.com/office/drawing/2010/main" val="0"/>
+              </a:ext>
+            </a:extLst>
+          </a:blip>
+          <a:srcRect/>
+          <a:stretch>
+            <a:fillRect/>
+          </a:stretch>
+        </p:blipFill>
+        <p:spPr bwMode="auto">
           <a:xfrm>
-            <a:off x="2830287" y="2194493"/>
-            <a:ext cx="3164114" cy="708363"/>
+            <a:off x="0" y="642938"/>
+            <a:ext cx="9191625" cy="3857625"/>
           </a:xfrm>
+          <a:prstGeom prst="rect">
+            <a:avLst/>
+          </a:prstGeom>
+          <a:noFill/>
+          <a:ln>
+            <a:noFill/>
+          </a:ln>
+          <a:extLst>
+            <a:ext uri="{909E8E84-426E-40DD-AFC4-6F175D3DCCD1}">
+              <a14:hiddenFill xmlns:a14="http://schemas.microsoft.com/office/drawing/2010/main">
+                <a:solidFill>
+                  <a:schemeClr val="accent1"/>
+                </a:solidFill>
+              </a14:hiddenFill>
+            </a:ext>
+            <a:ext uri="{91240B29-F687-4F45-9708-019B960494DF}">
+              <a14:hiddenLine xmlns:a14="http://schemas.microsoft.com/office/drawing/2010/main" w="9525">
+                <a:solidFill>
+                  <a:schemeClr val="tx1"/>
+                </a:solidFill>
+                <a:miter lim="800000"/>
+                <a:headEnd/>
+                <a:tailEnd/>
+              </a14:hiddenLine>
+            </a:ext>
+          </a:extLst>
         </p:spPr>
-        <p:txBody>
-          <a:bodyPr/>
-          <a:lstStyle/>
-          <a:p>
-            <a:r>
-              <a:rPr lang="en-GB" sz="3600" dirty="0" smtClean="0"/>
-              <a:t>Current C++11</a:t>
-            </a:r>
-            <a:endParaRPr lang="en-GB" sz="3600" dirty="0"/>
-          </a:p>
-        </p:txBody>
-      </p:sp>
+      </p:pic>
     </p:spTree>
     <p:extLst>
       <p:ext uri="{BB962C8B-B14F-4D97-AF65-F5344CB8AC3E}">

</xml_diff>